<commit_message>
x class project update
</commit_message>
<xml_diff>
--- a/XI class/02. DS and Algo - Module 2/08. Дървета-и-Графи/Дървета-и-Графи.pptx
+++ b/XI class/02. DS and Algo - Module 2/08. Дървета-и-Графи/Дървета-и-Графи.pptx
@@ -18,6 +18,11 @@
     <p:sldId id="294" r:id="rId12"/>
     <p:sldId id="295" r:id="rId13"/>
     <p:sldId id="296" r:id="rId14"/>
+    <p:sldId id="298" r:id="rId15"/>
+    <p:sldId id="297" r:id="rId16"/>
+    <p:sldId id="299" r:id="rId17"/>
+    <p:sldId id="300" r:id="rId18"/>
+    <p:sldId id="301" r:id="rId19"/>
   </p:sldIdLst>
   <p:sldSz cx="12192000" cy="6858000"/>
   <p:notesSz cx="6858000" cy="9144000"/>
@@ -137,7 +142,13 @@
           </p14:sldIdLst>
         </p14:section>
         <p14:section name="xib" id="{B20CF667-C4D9-47A1-A945-E186E92BF6AF}">
-          <p14:sldIdLst/>
+          <p14:sldIdLst>
+            <p14:sldId id="298"/>
+            <p14:sldId id="297"/>
+            <p14:sldId id="299"/>
+            <p14:sldId id="300"/>
+            <p14:sldId id="301"/>
+          </p14:sldIdLst>
         </p14:section>
       </p14:sectionLst>
     </p:ext>
@@ -297,7 +308,7 @@
           <a:p>
             <a:fld id="{3DCDD116-73C5-4B5A-80E0-3C3E4F493EA3}" type="datetimeFigureOut">
               <a:rPr lang="en-GB" smtClean="0"/>
-              <a:t>06/05/2024</a:t>
+              <a:t>12/05/2024</a:t>
             </a:fld>
             <a:endParaRPr lang="en-GB"/>
           </a:p>
@@ -497,7 +508,7 @@
           <a:p>
             <a:fld id="{3DCDD116-73C5-4B5A-80E0-3C3E4F493EA3}" type="datetimeFigureOut">
               <a:rPr lang="en-GB" smtClean="0"/>
-              <a:t>06/05/2024</a:t>
+              <a:t>12/05/2024</a:t>
             </a:fld>
             <a:endParaRPr lang="en-GB"/>
           </a:p>
@@ -707,7 +718,7 @@
           <a:p>
             <a:fld id="{3DCDD116-73C5-4B5A-80E0-3C3E4F493EA3}" type="datetimeFigureOut">
               <a:rPr lang="en-GB" smtClean="0"/>
-              <a:t>06/05/2024</a:t>
+              <a:t>12/05/2024</a:t>
             </a:fld>
             <a:endParaRPr lang="en-GB"/>
           </a:p>
@@ -907,7 +918,7 @@
           <a:p>
             <a:fld id="{3DCDD116-73C5-4B5A-80E0-3C3E4F493EA3}" type="datetimeFigureOut">
               <a:rPr lang="en-GB" smtClean="0"/>
-              <a:t>06/05/2024</a:t>
+              <a:t>12/05/2024</a:t>
             </a:fld>
             <a:endParaRPr lang="en-GB"/>
           </a:p>
@@ -1183,7 +1194,7 @@
           <a:p>
             <a:fld id="{3DCDD116-73C5-4B5A-80E0-3C3E4F493EA3}" type="datetimeFigureOut">
               <a:rPr lang="en-GB" smtClean="0"/>
-              <a:t>06/05/2024</a:t>
+              <a:t>12/05/2024</a:t>
             </a:fld>
             <a:endParaRPr lang="en-GB"/>
           </a:p>
@@ -1451,7 +1462,7 @@
           <a:p>
             <a:fld id="{3DCDD116-73C5-4B5A-80E0-3C3E4F493EA3}" type="datetimeFigureOut">
               <a:rPr lang="en-GB" smtClean="0"/>
-              <a:t>06/05/2024</a:t>
+              <a:t>12/05/2024</a:t>
             </a:fld>
             <a:endParaRPr lang="en-GB"/>
           </a:p>
@@ -1866,7 +1877,7 @@
           <a:p>
             <a:fld id="{3DCDD116-73C5-4B5A-80E0-3C3E4F493EA3}" type="datetimeFigureOut">
               <a:rPr lang="en-GB" smtClean="0"/>
-              <a:t>06/05/2024</a:t>
+              <a:t>12/05/2024</a:t>
             </a:fld>
             <a:endParaRPr lang="en-GB"/>
           </a:p>
@@ -2008,7 +2019,7 @@
           <a:p>
             <a:fld id="{3DCDD116-73C5-4B5A-80E0-3C3E4F493EA3}" type="datetimeFigureOut">
               <a:rPr lang="en-GB" smtClean="0"/>
-              <a:t>06/05/2024</a:t>
+              <a:t>12/05/2024</a:t>
             </a:fld>
             <a:endParaRPr lang="en-GB"/>
           </a:p>
@@ -2121,7 +2132,7 @@
           <a:p>
             <a:fld id="{3DCDD116-73C5-4B5A-80E0-3C3E4F493EA3}" type="datetimeFigureOut">
               <a:rPr lang="en-GB" smtClean="0"/>
-              <a:t>06/05/2024</a:t>
+              <a:t>12/05/2024</a:t>
             </a:fld>
             <a:endParaRPr lang="en-GB"/>
           </a:p>
@@ -2434,7 +2445,7 @@
           <a:p>
             <a:fld id="{3DCDD116-73C5-4B5A-80E0-3C3E4F493EA3}" type="datetimeFigureOut">
               <a:rPr lang="en-GB" smtClean="0"/>
-              <a:t>06/05/2024</a:t>
+              <a:t>12/05/2024</a:t>
             </a:fld>
             <a:endParaRPr lang="en-GB"/>
           </a:p>
@@ -2723,7 +2734,7 @@
           <a:p>
             <a:fld id="{3DCDD116-73C5-4B5A-80E0-3C3E4F493EA3}" type="datetimeFigureOut">
               <a:rPr lang="en-GB" smtClean="0"/>
-              <a:t>06/05/2024</a:t>
+              <a:t>12/05/2024</a:t>
             </a:fld>
             <a:endParaRPr lang="en-GB"/>
           </a:p>
@@ -2966,7 +2977,7 @@
           <a:p>
             <a:fld id="{3DCDD116-73C5-4B5A-80E0-3C3E4F493EA3}" type="datetimeFigureOut">
               <a:rPr lang="en-GB" smtClean="0"/>
-              <a:t>06/05/2024</a:t>
+              <a:t>12/05/2024</a:t>
             </a:fld>
             <a:endParaRPr lang="en-GB"/>
           </a:p>
@@ -5062,6 +5073,1742 @@
 </p:sld>
 </file>
 
+<file path=ppt/slides/slide14.xml><?xml version="1.0" encoding="utf-8"?>
+<p:sld xmlns:a="http://schemas.openxmlformats.org/drawingml/2006/main" xmlns:r="http://schemas.openxmlformats.org/officeDocument/2006/relationships" xmlns:p="http://schemas.openxmlformats.org/presentationml/2006/main">
+  <p:cSld>
+    <p:spTree>
+      <p:nvGrpSpPr>
+        <p:cNvPr id="1" name=""/>
+        <p:cNvGrpSpPr/>
+        <p:nvPr/>
+      </p:nvGrpSpPr>
+      <p:grpSpPr>
+        <a:xfrm>
+          <a:off x="0" y="0"/>
+          <a:ext cx="0" cy="0"/>
+          <a:chOff x="0" y="0"/>
+          <a:chExt cx="0" cy="0"/>
+        </a:xfrm>
+      </p:grpSpPr>
+      <p:sp>
+        <p:nvSpPr>
+          <p:cNvPr id="4" name="Текстово поле 3">
+            <a:extLst>
+              <a:ext uri="{FF2B5EF4-FFF2-40B4-BE49-F238E27FC236}">
+                <a16:creationId xmlns:a16="http://schemas.microsoft.com/office/drawing/2014/main" id="{D8C042C9-D12F-A349-AB33-E6A49C5CAAD8}"/>
+              </a:ext>
+            </a:extLst>
+          </p:cNvPr>
+          <p:cNvSpPr txBox="1"/>
+          <p:nvPr/>
+        </p:nvSpPr>
+        <p:spPr>
+          <a:xfrm>
+            <a:off x="334108" y="112055"/>
+            <a:ext cx="2717411" cy="646331"/>
+          </a:xfrm>
+          <a:prstGeom prst="rect">
+            <a:avLst/>
+          </a:prstGeom>
+          <a:noFill/>
+        </p:spPr>
+        <p:txBody>
+          <a:bodyPr wrap="none" rtlCol="0">
+            <a:spAutoFit/>
+          </a:bodyPr>
+          <a:lstStyle/>
+          <a:p>
+            <a:r>
+              <a:rPr lang="bg-BG" sz="3600" dirty="0">
+                <a:solidFill>
+                  <a:schemeClr val="bg1"/>
+                </a:solidFill>
+                <a:latin typeface="Consolas" panose="020B0609020204030204" pitchFamily="49" charset="0"/>
+              </a:rPr>
+              <a:t>СЪДЪРЖАНИЕ</a:t>
+            </a:r>
+            <a:endParaRPr lang="en-GB" sz="3600" dirty="0">
+              <a:solidFill>
+                <a:schemeClr val="bg1"/>
+              </a:solidFill>
+              <a:latin typeface="Consolas" panose="020B0609020204030204" pitchFamily="49" charset="0"/>
+            </a:endParaRPr>
+          </a:p>
+        </p:txBody>
+      </p:sp>
+      <p:sp>
+        <p:nvSpPr>
+          <p:cNvPr id="10" name="Текстово поле 9">
+            <a:extLst>
+              <a:ext uri="{FF2B5EF4-FFF2-40B4-BE49-F238E27FC236}">
+                <a16:creationId xmlns:a16="http://schemas.microsoft.com/office/drawing/2014/main" id="{2175E865-0397-6998-2F36-8A4A62C9C43F}"/>
+              </a:ext>
+            </a:extLst>
+          </p:cNvPr>
+          <p:cNvSpPr txBox="1"/>
+          <p:nvPr/>
+        </p:nvSpPr>
+        <p:spPr>
+          <a:xfrm>
+            <a:off x="2582008" y="5133431"/>
+            <a:ext cx="7218485" cy="646331"/>
+          </a:xfrm>
+          <a:prstGeom prst="rect">
+            <a:avLst/>
+          </a:prstGeom>
+          <a:noFill/>
+        </p:spPr>
+        <p:txBody>
+          <a:bodyPr wrap="square" rtlCol="0">
+            <a:spAutoFit/>
+          </a:bodyPr>
+          <a:lstStyle/>
+          <a:p>
+            <a:pPr algn="ctr"/>
+            <a:r>
+              <a:rPr lang="bg-BG" sz="3600" b="1" dirty="0">
+                <a:solidFill>
+                  <a:srgbClr val="0070C0"/>
+                </a:solidFill>
+                <a:latin typeface="Consolas" panose="020B0609020204030204" pitchFamily="49" charset="0"/>
+              </a:rPr>
+              <a:t>Дървета</a:t>
+            </a:r>
+            <a:endParaRPr lang="en-GB" sz="3600" b="1" dirty="0">
+              <a:solidFill>
+                <a:srgbClr val="0070C0"/>
+              </a:solidFill>
+              <a:latin typeface="Consolas" panose="020B0609020204030204" pitchFamily="49" charset="0"/>
+            </a:endParaRPr>
+          </a:p>
+        </p:txBody>
+      </p:sp>
+      <p:pic>
+        <p:nvPicPr>
+          <p:cNvPr id="5" name="Картина 4" descr="Картина, която съдържа кръг, диаграма, цветност, линия&#10;&#10;Описанието е генерирано автоматично">
+            <a:extLst>
+              <a:ext uri="{FF2B5EF4-FFF2-40B4-BE49-F238E27FC236}">
+                <a16:creationId xmlns:a16="http://schemas.microsoft.com/office/drawing/2014/main" id="{946B4E24-728B-4639-7832-4D6513B1B9EC}"/>
+              </a:ext>
+            </a:extLst>
+          </p:cNvPr>
+          <p:cNvPicPr>
+            <a:picLocks noChangeAspect="1"/>
+          </p:cNvPicPr>
+          <p:nvPr/>
+        </p:nvPicPr>
+        <p:blipFill>
+          <a:blip r:embed="rId2">
+            <a:extLst>
+              <a:ext uri="{28A0092B-C50C-407E-A947-70E740481C1C}">
+                <a14:useLocalDpi xmlns:a14="http://schemas.microsoft.com/office/drawing/2010/main" val="0"/>
+              </a:ext>
+            </a:extLst>
+          </a:blip>
+          <a:stretch>
+            <a:fillRect/>
+          </a:stretch>
+        </p:blipFill>
+        <p:spPr>
+          <a:xfrm>
+            <a:off x="4260056" y="971125"/>
+            <a:ext cx="3671888" cy="3591009"/>
+          </a:xfrm>
+          <a:prstGeom prst="rect">
+            <a:avLst/>
+          </a:prstGeom>
+        </p:spPr>
+      </p:pic>
+    </p:spTree>
+    <p:extLst>
+      <p:ext uri="{BB962C8B-B14F-4D97-AF65-F5344CB8AC3E}">
+        <p14:creationId xmlns:p14="http://schemas.microsoft.com/office/powerpoint/2010/main" val="2324942697"/>
+      </p:ext>
+    </p:extLst>
+  </p:cSld>
+  <p:clrMapOvr>
+    <a:masterClrMapping/>
+  </p:clrMapOvr>
+</p:sld>
+</file>
+
+<file path=ppt/slides/slide15.xml><?xml version="1.0" encoding="utf-8"?>
+<p:sld xmlns:a="http://schemas.openxmlformats.org/drawingml/2006/main" xmlns:r="http://schemas.openxmlformats.org/officeDocument/2006/relationships" xmlns:p="http://schemas.openxmlformats.org/presentationml/2006/main">
+  <p:cSld>
+    <p:spTree>
+      <p:nvGrpSpPr>
+        <p:cNvPr id="1" name=""/>
+        <p:cNvGrpSpPr/>
+        <p:nvPr/>
+      </p:nvGrpSpPr>
+      <p:grpSpPr>
+        <a:xfrm>
+          <a:off x="0" y="0"/>
+          <a:ext cx="0" cy="0"/>
+          <a:chOff x="0" y="0"/>
+          <a:chExt cx="0" cy="0"/>
+        </a:xfrm>
+      </p:grpSpPr>
+      <p:sp>
+        <p:nvSpPr>
+          <p:cNvPr id="3" name="Правоъгълник 2">
+            <a:extLst>
+              <a:ext uri="{FF2B5EF4-FFF2-40B4-BE49-F238E27FC236}">
+                <a16:creationId xmlns:a16="http://schemas.microsoft.com/office/drawing/2014/main" id="{C4C4CCE4-6FAF-6FB7-D4A3-B99110DD8FF4}"/>
+              </a:ext>
+            </a:extLst>
+          </p:cNvPr>
+          <p:cNvSpPr/>
+          <p:nvPr/>
+        </p:nvSpPr>
+        <p:spPr>
+          <a:xfrm>
+            <a:off x="8791" y="2"/>
+            <a:ext cx="940778" cy="6857998"/>
+          </a:xfrm>
+          <a:prstGeom prst="rect">
+            <a:avLst/>
+          </a:prstGeom>
+        </p:spPr>
+        <p:style>
+          <a:lnRef idx="2">
+            <a:schemeClr val="accent1">
+              <a:shade val="15000"/>
+            </a:schemeClr>
+          </a:lnRef>
+          <a:fillRef idx="1">
+            <a:schemeClr val="accent1"/>
+          </a:fillRef>
+          <a:effectRef idx="0">
+            <a:schemeClr val="accent1"/>
+          </a:effectRef>
+          <a:fontRef idx="minor">
+            <a:schemeClr val="lt1"/>
+          </a:fontRef>
+        </p:style>
+        <p:txBody>
+          <a:bodyPr rtlCol="0" anchor="ctr"/>
+          <a:lstStyle/>
+          <a:p>
+            <a:pPr algn="ctr"/>
+            <a:endParaRPr lang="en-GB" dirty="0"/>
+          </a:p>
+        </p:txBody>
+      </p:sp>
+      <p:sp>
+        <p:nvSpPr>
+          <p:cNvPr id="4" name="Текстово поле 3">
+            <a:extLst>
+              <a:ext uri="{FF2B5EF4-FFF2-40B4-BE49-F238E27FC236}">
+                <a16:creationId xmlns:a16="http://schemas.microsoft.com/office/drawing/2014/main" id="{D8C042C9-D12F-A349-AB33-E6A49C5CAAD8}"/>
+              </a:ext>
+            </a:extLst>
+          </p:cNvPr>
+          <p:cNvSpPr txBox="1"/>
+          <p:nvPr/>
+        </p:nvSpPr>
+        <p:spPr>
+          <a:xfrm>
+            <a:off x="1107825" y="156016"/>
+            <a:ext cx="6287299" cy="584775"/>
+          </a:xfrm>
+          <a:prstGeom prst="rect">
+            <a:avLst/>
+          </a:prstGeom>
+          <a:noFill/>
+        </p:spPr>
+        <p:txBody>
+          <a:bodyPr wrap="none" rtlCol="0">
+            <a:spAutoFit/>
+          </a:bodyPr>
+          <a:lstStyle/>
+          <a:p>
+            <a:r>
+              <a:rPr lang="bg-BG" sz="3200" b="1" dirty="0">
+                <a:solidFill>
+                  <a:srgbClr val="0070C0"/>
+                </a:solidFill>
+                <a:latin typeface="Consolas" panose="020B0609020204030204" pitchFamily="49" charset="0"/>
+              </a:rPr>
+              <a:t>2.1. Дърво и кореново дърво</a:t>
+            </a:r>
+            <a:endParaRPr lang="en-GB" sz="3200" b="1" dirty="0">
+              <a:solidFill>
+                <a:srgbClr val="0070C0"/>
+              </a:solidFill>
+              <a:latin typeface="Consolas" panose="020B0609020204030204" pitchFamily="49" charset="0"/>
+            </a:endParaRPr>
+          </a:p>
+        </p:txBody>
+      </p:sp>
+      <p:sp>
+        <p:nvSpPr>
+          <p:cNvPr id="16" name="Текстово поле 15">
+            <a:extLst>
+              <a:ext uri="{FF2B5EF4-FFF2-40B4-BE49-F238E27FC236}">
+                <a16:creationId xmlns:a16="http://schemas.microsoft.com/office/drawing/2014/main" id="{3E348C78-D6D9-A728-1765-3F7A272B9A4E}"/>
+              </a:ext>
+            </a:extLst>
+          </p:cNvPr>
+          <p:cNvSpPr txBox="1"/>
+          <p:nvPr/>
+        </p:nvSpPr>
+        <p:spPr>
+          <a:xfrm rot="16200000">
+            <a:off x="-1300827" y="1749575"/>
+            <a:ext cx="3603872" cy="369332"/>
+          </a:xfrm>
+          <a:prstGeom prst="rect">
+            <a:avLst/>
+          </a:prstGeom>
+          <a:noFill/>
+        </p:spPr>
+        <p:txBody>
+          <a:bodyPr wrap="none" rtlCol="0">
+            <a:spAutoFit/>
+          </a:bodyPr>
+          <a:lstStyle/>
+          <a:p>
+            <a:r>
+              <a:rPr lang="bg-BG" dirty="0">
+                <a:solidFill>
+                  <a:schemeClr val="bg1"/>
+                </a:solidFill>
+                <a:latin typeface="Consolas" panose="020B0609020204030204" pitchFamily="49" charset="0"/>
+              </a:rPr>
+              <a:t>2.1. Дърво и кореново дърво</a:t>
+            </a:r>
+            <a:endParaRPr lang="en-GB" dirty="0">
+              <a:solidFill>
+                <a:schemeClr val="bg1"/>
+              </a:solidFill>
+              <a:latin typeface="Consolas" panose="020B0609020204030204" pitchFamily="49" charset="0"/>
+            </a:endParaRPr>
+          </a:p>
+        </p:txBody>
+      </p:sp>
+      <p:cxnSp>
+        <p:nvCxnSpPr>
+          <p:cNvPr id="6" name="Право съединение 5">
+            <a:extLst>
+              <a:ext uri="{FF2B5EF4-FFF2-40B4-BE49-F238E27FC236}">
+                <a16:creationId xmlns:a16="http://schemas.microsoft.com/office/drawing/2014/main" id="{3434733A-9C28-1217-62E3-CB9178A07F2B}"/>
+              </a:ext>
+            </a:extLst>
+          </p:cNvPr>
+          <p:cNvCxnSpPr/>
+          <p:nvPr/>
+        </p:nvCxnSpPr>
+        <p:spPr>
+          <a:xfrm>
+            <a:off x="949569" y="738552"/>
+            <a:ext cx="11242431" cy="0"/>
+          </a:xfrm>
+          <a:prstGeom prst="line">
+            <a:avLst/>
+          </a:prstGeom>
+        </p:spPr>
+        <p:style>
+          <a:lnRef idx="1">
+            <a:schemeClr val="accent1"/>
+          </a:lnRef>
+          <a:fillRef idx="0">
+            <a:schemeClr val="accent1"/>
+          </a:fillRef>
+          <a:effectRef idx="0">
+            <a:schemeClr val="accent1"/>
+          </a:effectRef>
+          <a:fontRef idx="minor">
+            <a:schemeClr val="tx1"/>
+          </a:fontRef>
+        </p:style>
+      </p:cxnSp>
+      <p:sp>
+        <p:nvSpPr>
+          <p:cNvPr id="5" name="Текстово поле 4">
+            <a:extLst>
+              <a:ext uri="{FF2B5EF4-FFF2-40B4-BE49-F238E27FC236}">
+                <a16:creationId xmlns:a16="http://schemas.microsoft.com/office/drawing/2014/main" id="{8D7DDE06-F16C-723E-E5DF-23CAE1509F22}"/>
+              </a:ext>
+            </a:extLst>
+          </p:cNvPr>
+          <p:cNvSpPr txBox="1"/>
+          <p:nvPr/>
+        </p:nvSpPr>
+        <p:spPr>
+          <a:xfrm>
+            <a:off x="668189" y="830611"/>
+            <a:ext cx="10999203" cy="1200329"/>
+          </a:xfrm>
+          <a:prstGeom prst="rect">
+            <a:avLst/>
+          </a:prstGeom>
+          <a:noFill/>
+        </p:spPr>
+        <p:txBody>
+          <a:bodyPr wrap="square" rtlCol="0">
+            <a:spAutoFit/>
+          </a:bodyPr>
+          <a:lstStyle/>
+          <a:p>
+            <a:pPr marL="800100" lvl="1" indent="-342900">
+              <a:buFontTx/>
+              <a:buChar char="-"/>
+            </a:pPr>
+            <a:r>
+              <a:rPr lang="bg-BG" sz="2400" dirty="0">
+                <a:solidFill>
+                  <a:schemeClr val="accent2"/>
+                </a:solidFill>
+                <a:latin typeface="Consolas" panose="020B0609020204030204" pitchFamily="49" charset="0"/>
+              </a:rPr>
+              <a:t>Гора </a:t>
+            </a:r>
+            <a:r>
+              <a:rPr lang="bg-BG" sz="2400" dirty="0">
+                <a:solidFill>
+                  <a:schemeClr val="accent1"/>
+                </a:solidFill>
+                <a:latin typeface="Consolas" panose="020B0609020204030204" pitchFamily="49" charset="0"/>
+              </a:rPr>
+              <a:t>– </a:t>
+            </a:r>
+            <a:r>
+              <a:rPr lang="bg-BG" sz="2400" dirty="0">
+                <a:solidFill>
+                  <a:srgbClr val="0070C0"/>
+                </a:solidFill>
+                <a:latin typeface="Consolas" panose="020B0609020204030204" pitchFamily="49" charset="0"/>
+              </a:rPr>
+              <a:t>граф без цикли</a:t>
+            </a:r>
+          </a:p>
+          <a:p>
+            <a:pPr marL="800100" lvl="1" indent="-342900">
+              <a:buFontTx/>
+              <a:buChar char="-"/>
+            </a:pPr>
+            <a:r>
+              <a:rPr lang="bg-BG" sz="2400" dirty="0">
+                <a:solidFill>
+                  <a:schemeClr val="accent2"/>
+                </a:solidFill>
+                <a:latin typeface="Consolas" panose="020B0609020204030204" pitchFamily="49" charset="0"/>
+              </a:rPr>
+              <a:t>Дърво</a:t>
+            </a:r>
+            <a:r>
+              <a:rPr lang="bg-BG" sz="2400" dirty="0">
+                <a:solidFill>
+                  <a:srgbClr val="0070C0"/>
+                </a:solidFill>
+                <a:latin typeface="Consolas" panose="020B0609020204030204" pitchFamily="49" charset="0"/>
+              </a:rPr>
+              <a:t> – свързан граф без цикли – </a:t>
+            </a:r>
+            <a:r>
+              <a:rPr lang="en-GB" sz="2400" dirty="0">
+                <a:solidFill>
+                  <a:srgbClr val="0070C0"/>
+                </a:solidFill>
+                <a:latin typeface="Consolas" panose="020B0609020204030204" pitchFamily="49" charset="0"/>
+              </a:rPr>
+              <a:t>T(V, E)</a:t>
+            </a:r>
+            <a:endParaRPr lang="bg-BG" sz="2400" dirty="0">
+              <a:solidFill>
+                <a:srgbClr val="0070C0"/>
+              </a:solidFill>
+              <a:latin typeface="Consolas" panose="020B0609020204030204" pitchFamily="49" charset="0"/>
+            </a:endParaRPr>
+          </a:p>
+          <a:p>
+            <a:pPr marL="800100" lvl="1" indent="-342900">
+              <a:buFontTx/>
+              <a:buChar char="-"/>
+            </a:pPr>
+            <a:r>
+              <a:rPr lang="bg-BG" sz="2400" dirty="0">
+                <a:solidFill>
+                  <a:schemeClr val="accent2"/>
+                </a:solidFill>
+                <a:latin typeface="Consolas" panose="020B0609020204030204" pitchFamily="49" charset="0"/>
+              </a:rPr>
+              <a:t>Кореново дърво </a:t>
+            </a:r>
+            <a:r>
+              <a:rPr lang="bg-BG" sz="2400" dirty="0">
+                <a:solidFill>
+                  <a:srgbClr val="0070C0"/>
+                </a:solidFill>
+                <a:latin typeface="Consolas" panose="020B0609020204030204" pitchFamily="49" charset="0"/>
+              </a:rPr>
+              <a:t>– дърво с корен</a:t>
+            </a:r>
+            <a:r>
+              <a:rPr lang="en-GB" sz="2400" dirty="0">
+                <a:solidFill>
+                  <a:srgbClr val="0070C0"/>
+                </a:solidFill>
+                <a:latin typeface="Consolas" panose="020B0609020204030204" pitchFamily="49" charset="0"/>
+              </a:rPr>
+              <a:t> – T(V, E) </a:t>
+            </a:r>
+            <a:r>
+              <a:rPr lang="bg-BG" sz="2400" dirty="0">
+                <a:solidFill>
+                  <a:srgbClr val="0070C0"/>
+                </a:solidFill>
+                <a:latin typeface="Consolas" panose="020B0609020204030204" pitchFamily="49" charset="0"/>
+              </a:rPr>
+              <a:t>и корен </a:t>
+            </a:r>
+            <a:r>
+              <a:rPr lang="en-GB" sz="2400" b="1" dirty="0">
+                <a:solidFill>
+                  <a:srgbClr val="0070C0"/>
+                </a:solidFill>
+                <a:latin typeface="Consolas" panose="020B0609020204030204" pitchFamily="49" charset="0"/>
+              </a:rPr>
+              <a:t>r</a:t>
+            </a:r>
+          </a:p>
+        </p:txBody>
+      </p:sp>
+      <p:pic>
+        <p:nvPicPr>
+          <p:cNvPr id="13" name="Картина 12">
+            <a:extLst>
+              <a:ext uri="{FF2B5EF4-FFF2-40B4-BE49-F238E27FC236}">
+                <a16:creationId xmlns:a16="http://schemas.microsoft.com/office/drawing/2014/main" id="{22FB0808-B1F6-5500-1A40-263884A7575F}"/>
+              </a:ext>
+            </a:extLst>
+          </p:cNvPr>
+          <p:cNvPicPr>
+            <a:picLocks noChangeAspect="1"/>
+          </p:cNvPicPr>
+          <p:nvPr/>
+        </p:nvPicPr>
+        <p:blipFill>
+          <a:blip r:embed="rId2"/>
+          <a:stretch>
+            <a:fillRect/>
+          </a:stretch>
+        </p:blipFill>
+        <p:spPr>
+          <a:xfrm>
+            <a:off x="1257220" y="2587095"/>
+            <a:ext cx="3101873" cy="2688290"/>
+          </a:xfrm>
+          <a:prstGeom prst="rect">
+            <a:avLst/>
+          </a:prstGeom>
+        </p:spPr>
+      </p:pic>
+      <p:pic>
+        <p:nvPicPr>
+          <p:cNvPr id="21" name="Картина 20">
+            <a:extLst>
+              <a:ext uri="{FF2B5EF4-FFF2-40B4-BE49-F238E27FC236}">
+                <a16:creationId xmlns:a16="http://schemas.microsoft.com/office/drawing/2014/main" id="{5E22B9D4-A9BA-923A-3686-B008E9102AF7}"/>
+              </a:ext>
+            </a:extLst>
+          </p:cNvPr>
+          <p:cNvPicPr>
+            <a:picLocks noChangeAspect="1"/>
+          </p:cNvPicPr>
+          <p:nvPr/>
+        </p:nvPicPr>
+        <p:blipFill>
+          <a:blip r:embed="rId3"/>
+          <a:stretch>
+            <a:fillRect/>
+          </a:stretch>
+        </p:blipFill>
+        <p:spPr>
+          <a:xfrm>
+            <a:off x="5431308" y="2861548"/>
+            <a:ext cx="2724150" cy="2466975"/>
+          </a:xfrm>
+          <a:prstGeom prst="rect">
+            <a:avLst/>
+          </a:prstGeom>
+        </p:spPr>
+      </p:pic>
+      <p:pic>
+        <p:nvPicPr>
+          <p:cNvPr id="23" name="Картина 22">
+            <a:extLst>
+              <a:ext uri="{FF2B5EF4-FFF2-40B4-BE49-F238E27FC236}">
+                <a16:creationId xmlns:a16="http://schemas.microsoft.com/office/drawing/2014/main" id="{DBAF2FB8-7A45-6DD0-329C-385266A738FD}"/>
+              </a:ext>
+            </a:extLst>
+          </p:cNvPr>
+          <p:cNvPicPr>
+            <a:picLocks noChangeAspect="1"/>
+          </p:cNvPicPr>
+          <p:nvPr/>
+        </p:nvPicPr>
+        <p:blipFill>
+          <a:blip r:embed="rId4"/>
+          <a:stretch>
+            <a:fillRect/>
+          </a:stretch>
+        </p:blipFill>
+        <p:spPr>
+          <a:xfrm>
+            <a:off x="9227674" y="2861549"/>
+            <a:ext cx="2273030" cy="2466975"/>
+          </a:xfrm>
+          <a:prstGeom prst="rect">
+            <a:avLst/>
+          </a:prstGeom>
+        </p:spPr>
+      </p:pic>
+    </p:spTree>
+    <p:extLst>
+      <p:ext uri="{BB962C8B-B14F-4D97-AF65-F5344CB8AC3E}">
+        <p14:creationId xmlns:p14="http://schemas.microsoft.com/office/powerpoint/2010/main" val="2623152458"/>
+      </p:ext>
+    </p:extLst>
+  </p:cSld>
+  <p:clrMapOvr>
+    <a:masterClrMapping/>
+  </p:clrMapOvr>
+</p:sld>
+</file>
+
+<file path=ppt/slides/slide16.xml><?xml version="1.0" encoding="utf-8"?>
+<p:sld xmlns:a="http://schemas.openxmlformats.org/drawingml/2006/main" xmlns:r="http://schemas.openxmlformats.org/officeDocument/2006/relationships" xmlns:p="http://schemas.openxmlformats.org/presentationml/2006/main">
+  <p:cSld>
+    <p:spTree>
+      <p:nvGrpSpPr>
+        <p:cNvPr id="1" name=""/>
+        <p:cNvGrpSpPr/>
+        <p:nvPr/>
+      </p:nvGrpSpPr>
+      <p:grpSpPr>
+        <a:xfrm>
+          <a:off x="0" y="0"/>
+          <a:ext cx="0" cy="0"/>
+          <a:chOff x="0" y="0"/>
+          <a:chExt cx="0" cy="0"/>
+        </a:xfrm>
+      </p:grpSpPr>
+      <p:sp>
+        <p:nvSpPr>
+          <p:cNvPr id="3" name="Правоъгълник 2">
+            <a:extLst>
+              <a:ext uri="{FF2B5EF4-FFF2-40B4-BE49-F238E27FC236}">
+                <a16:creationId xmlns:a16="http://schemas.microsoft.com/office/drawing/2014/main" id="{C4C4CCE4-6FAF-6FB7-D4A3-B99110DD8FF4}"/>
+              </a:ext>
+            </a:extLst>
+          </p:cNvPr>
+          <p:cNvSpPr/>
+          <p:nvPr/>
+        </p:nvSpPr>
+        <p:spPr>
+          <a:xfrm>
+            <a:off x="8791" y="2"/>
+            <a:ext cx="940778" cy="6857998"/>
+          </a:xfrm>
+          <a:prstGeom prst="rect">
+            <a:avLst/>
+          </a:prstGeom>
+        </p:spPr>
+        <p:style>
+          <a:lnRef idx="2">
+            <a:schemeClr val="accent1">
+              <a:shade val="15000"/>
+            </a:schemeClr>
+          </a:lnRef>
+          <a:fillRef idx="1">
+            <a:schemeClr val="accent1"/>
+          </a:fillRef>
+          <a:effectRef idx="0">
+            <a:schemeClr val="accent1"/>
+          </a:effectRef>
+          <a:fontRef idx="minor">
+            <a:schemeClr val="lt1"/>
+          </a:fontRef>
+        </p:style>
+        <p:txBody>
+          <a:bodyPr rtlCol="0" anchor="ctr"/>
+          <a:lstStyle/>
+          <a:p>
+            <a:pPr algn="ctr"/>
+            <a:endParaRPr lang="en-GB" dirty="0"/>
+          </a:p>
+        </p:txBody>
+      </p:sp>
+      <p:sp>
+        <p:nvSpPr>
+          <p:cNvPr id="4" name="Текстово поле 3">
+            <a:extLst>
+              <a:ext uri="{FF2B5EF4-FFF2-40B4-BE49-F238E27FC236}">
+                <a16:creationId xmlns:a16="http://schemas.microsoft.com/office/drawing/2014/main" id="{D8C042C9-D12F-A349-AB33-E6A49C5CAAD8}"/>
+              </a:ext>
+            </a:extLst>
+          </p:cNvPr>
+          <p:cNvSpPr txBox="1"/>
+          <p:nvPr/>
+        </p:nvSpPr>
+        <p:spPr>
+          <a:xfrm>
+            <a:off x="1107825" y="156016"/>
+            <a:ext cx="5835252" cy="584775"/>
+          </a:xfrm>
+          <a:prstGeom prst="rect">
+            <a:avLst/>
+          </a:prstGeom>
+          <a:noFill/>
+        </p:spPr>
+        <p:txBody>
+          <a:bodyPr wrap="none" rtlCol="0">
+            <a:spAutoFit/>
+          </a:bodyPr>
+          <a:lstStyle/>
+          <a:p>
+            <a:r>
+              <a:rPr lang="bg-BG" sz="3200" b="1" dirty="0">
+                <a:solidFill>
+                  <a:srgbClr val="0070C0"/>
+                </a:solidFill>
+                <a:latin typeface="Consolas" panose="020B0609020204030204" pitchFamily="49" charset="0"/>
+              </a:rPr>
+              <a:t>2.2. Представяне на дърво</a:t>
+            </a:r>
+            <a:endParaRPr lang="en-GB" sz="3200" b="1" dirty="0">
+              <a:solidFill>
+                <a:srgbClr val="0070C0"/>
+              </a:solidFill>
+              <a:latin typeface="Consolas" panose="020B0609020204030204" pitchFamily="49" charset="0"/>
+            </a:endParaRPr>
+          </a:p>
+        </p:txBody>
+      </p:sp>
+      <p:sp>
+        <p:nvSpPr>
+          <p:cNvPr id="16" name="Текстово поле 15">
+            <a:extLst>
+              <a:ext uri="{FF2B5EF4-FFF2-40B4-BE49-F238E27FC236}">
+                <a16:creationId xmlns:a16="http://schemas.microsoft.com/office/drawing/2014/main" id="{3E348C78-D6D9-A728-1765-3F7A272B9A4E}"/>
+              </a:ext>
+            </a:extLst>
+          </p:cNvPr>
+          <p:cNvSpPr txBox="1"/>
+          <p:nvPr/>
+        </p:nvSpPr>
+        <p:spPr>
+          <a:xfrm rot="16200000">
+            <a:off x="-1174190" y="1646649"/>
+            <a:ext cx="3350597" cy="369332"/>
+          </a:xfrm>
+          <a:prstGeom prst="rect">
+            <a:avLst/>
+          </a:prstGeom>
+          <a:noFill/>
+        </p:spPr>
+        <p:txBody>
+          <a:bodyPr wrap="none" rtlCol="0">
+            <a:spAutoFit/>
+          </a:bodyPr>
+          <a:lstStyle/>
+          <a:p>
+            <a:r>
+              <a:rPr lang="bg-BG" dirty="0">
+                <a:solidFill>
+                  <a:schemeClr val="bg1"/>
+                </a:solidFill>
+                <a:latin typeface="Consolas" panose="020B0609020204030204" pitchFamily="49" charset="0"/>
+              </a:rPr>
+              <a:t>2.2. Представяне на дърво</a:t>
+            </a:r>
+            <a:endParaRPr lang="en-GB" dirty="0">
+              <a:solidFill>
+                <a:schemeClr val="bg1"/>
+              </a:solidFill>
+              <a:latin typeface="Consolas" panose="020B0609020204030204" pitchFamily="49" charset="0"/>
+            </a:endParaRPr>
+          </a:p>
+        </p:txBody>
+      </p:sp>
+      <p:cxnSp>
+        <p:nvCxnSpPr>
+          <p:cNvPr id="6" name="Право съединение 5">
+            <a:extLst>
+              <a:ext uri="{FF2B5EF4-FFF2-40B4-BE49-F238E27FC236}">
+                <a16:creationId xmlns:a16="http://schemas.microsoft.com/office/drawing/2014/main" id="{3434733A-9C28-1217-62E3-CB9178A07F2B}"/>
+              </a:ext>
+            </a:extLst>
+          </p:cNvPr>
+          <p:cNvCxnSpPr/>
+          <p:nvPr/>
+        </p:nvCxnSpPr>
+        <p:spPr>
+          <a:xfrm>
+            <a:off x="949569" y="738552"/>
+            <a:ext cx="11242431" cy="0"/>
+          </a:xfrm>
+          <a:prstGeom prst="line">
+            <a:avLst/>
+          </a:prstGeom>
+        </p:spPr>
+        <p:style>
+          <a:lnRef idx="1">
+            <a:schemeClr val="accent1"/>
+          </a:lnRef>
+          <a:fillRef idx="0">
+            <a:schemeClr val="accent1"/>
+          </a:fillRef>
+          <a:effectRef idx="0">
+            <a:schemeClr val="accent1"/>
+          </a:effectRef>
+          <a:fontRef idx="minor">
+            <a:schemeClr val="tx1"/>
+          </a:fontRef>
+        </p:style>
+      </p:cxnSp>
+      <p:sp>
+        <p:nvSpPr>
+          <p:cNvPr id="5" name="Текстово поле 4">
+            <a:extLst>
+              <a:ext uri="{FF2B5EF4-FFF2-40B4-BE49-F238E27FC236}">
+                <a16:creationId xmlns:a16="http://schemas.microsoft.com/office/drawing/2014/main" id="{8D7DDE06-F16C-723E-E5DF-23CAE1509F22}"/>
+              </a:ext>
+            </a:extLst>
+          </p:cNvPr>
+          <p:cNvSpPr txBox="1"/>
+          <p:nvPr/>
+        </p:nvSpPr>
+        <p:spPr>
+          <a:xfrm>
+            <a:off x="668189" y="830611"/>
+            <a:ext cx="10999203" cy="461665"/>
+          </a:xfrm>
+          <a:prstGeom prst="rect">
+            <a:avLst/>
+          </a:prstGeom>
+          <a:noFill/>
+        </p:spPr>
+        <p:txBody>
+          <a:bodyPr wrap="square" rtlCol="0">
+            <a:spAutoFit/>
+          </a:bodyPr>
+          <a:lstStyle/>
+          <a:p>
+            <a:pPr marL="800100" lvl="1" indent="-342900">
+              <a:buFontTx/>
+              <a:buChar char="-"/>
+            </a:pPr>
+            <a:r>
+              <a:rPr lang="bg-BG" sz="2400" dirty="0">
+                <a:solidFill>
+                  <a:schemeClr val="accent2"/>
+                </a:solidFill>
+                <a:latin typeface="Consolas" panose="020B0609020204030204" pitchFamily="49" charset="0"/>
+              </a:rPr>
+              <a:t>Списък на родителите</a:t>
+            </a:r>
+            <a:endParaRPr lang="en-GB" sz="2400" b="1" dirty="0">
+              <a:solidFill>
+                <a:srgbClr val="0070C0"/>
+              </a:solidFill>
+              <a:latin typeface="Consolas" panose="020B0609020204030204" pitchFamily="49" charset="0"/>
+            </a:endParaRPr>
+          </a:p>
+        </p:txBody>
+      </p:sp>
+      <p:pic>
+        <p:nvPicPr>
+          <p:cNvPr id="7" name="Картина 6">
+            <a:extLst>
+              <a:ext uri="{FF2B5EF4-FFF2-40B4-BE49-F238E27FC236}">
+                <a16:creationId xmlns:a16="http://schemas.microsoft.com/office/drawing/2014/main" id="{28563E4B-4F77-CDCB-B174-05D8C5924BFD}"/>
+              </a:ext>
+            </a:extLst>
+          </p:cNvPr>
+          <p:cNvPicPr>
+            <a:picLocks noChangeAspect="1"/>
+          </p:cNvPicPr>
+          <p:nvPr/>
+        </p:nvPicPr>
+        <p:blipFill>
+          <a:blip r:embed="rId2"/>
+          <a:stretch>
+            <a:fillRect/>
+          </a:stretch>
+        </p:blipFill>
+        <p:spPr>
+          <a:xfrm>
+            <a:off x="7888291" y="738552"/>
+            <a:ext cx="2190750" cy="2409825"/>
+          </a:xfrm>
+          <a:prstGeom prst="rect">
+            <a:avLst/>
+          </a:prstGeom>
+        </p:spPr>
+      </p:pic>
+      <p:pic>
+        <p:nvPicPr>
+          <p:cNvPr id="9" name="Картина 8">
+            <a:extLst>
+              <a:ext uri="{FF2B5EF4-FFF2-40B4-BE49-F238E27FC236}">
+                <a16:creationId xmlns:a16="http://schemas.microsoft.com/office/drawing/2014/main" id="{3998970F-E182-EC67-3281-85F599AF3213}"/>
+              </a:ext>
+            </a:extLst>
+          </p:cNvPr>
+          <p:cNvPicPr>
+            <a:picLocks noChangeAspect="1"/>
+          </p:cNvPicPr>
+          <p:nvPr/>
+        </p:nvPicPr>
+        <p:blipFill>
+          <a:blip r:embed="rId3"/>
+          <a:stretch>
+            <a:fillRect/>
+          </a:stretch>
+        </p:blipFill>
+        <p:spPr>
+          <a:xfrm>
+            <a:off x="1630989" y="1849452"/>
+            <a:ext cx="4829175" cy="809625"/>
+          </a:xfrm>
+          <a:prstGeom prst="rect">
+            <a:avLst/>
+          </a:prstGeom>
+        </p:spPr>
+      </p:pic>
+      <p:pic>
+        <p:nvPicPr>
+          <p:cNvPr id="11" name="Картина 10">
+            <a:extLst>
+              <a:ext uri="{FF2B5EF4-FFF2-40B4-BE49-F238E27FC236}">
+                <a16:creationId xmlns:a16="http://schemas.microsoft.com/office/drawing/2014/main" id="{2AEB9E13-76D9-AA5C-5B26-5EF3A4568F6E}"/>
+              </a:ext>
+            </a:extLst>
+          </p:cNvPr>
+          <p:cNvPicPr>
+            <a:picLocks noChangeAspect="1"/>
+          </p:cNvPicPr>
+          <p:nvPr/>
+        </p:nvPicPr>
+        <p:blipFill>
+          <a:blip r:embed="rId4"/>
+          <a:stretch>
+            <a:fillRect/>
+          </a:stretch>
+        </p:blipFill>
+        <p:spPr>
+          <a:xfrm>
+            <a:off x="8092851" y="3563073"/>
+            <a:ext cx="1986190" cy="2071688"/>
+          </a:xfrm>
+          <a:prstGeom prst="rect">
+            <a:avLst/>
+          </a:prstGeom>
+        </p:spPr>
+      </p:pic>
+      <p:pic>
+        <p:nvPicPr>
+          <p:cNvPr id="14" name="Картина 13">
+            <a:extLst>
+              <a:ext uri="{FF2B5EF4-FFF2-40B4-BE49-F238E27FC236}">
+                <a16:creationId xmlns:a16="http://schemas.microsoft.com/office/drawing/2014/main" id="{534C6BDC-E27B-FB79-88DB-91DF35C84CB4}"/>
+              </a:ext>
+            </a:extLst>
+          </p:cNvPr>
+          <p:cNvPicPr>
+            <a:picLocks noChangeAspect="1"/>
+          </p:cNvPicPr>
+          <p:nvPr/>
+        </p:nvPicPr>
+        <p:blipFill>
+          <a:blip r:embed="rId5"/>
+          <a:stretch>
+            <a:fillRect/>
+          </a:stretch>
+        </p:blipFill>
+        <p:spPr>
+          <a:xfrm>
+            <a:off x="1827334" y="3793239"/>
+            <a:ext cx="4743450" cy="723900"/>
+          </a:xfrm>
+          <a:prstGeom prst="rect">
+            <a:avLst/>
+          </a:prstGeom>
+        </p:spPr>
+      </p:pic>
+      <p:sp>
+        <p:nvSpPr>
+          <p:cNvPr id="18" name="Текстово поле 17">
+            <a:extLst>
+              <a:ext uri="{FF2B5EF4-FFF2-40B4-BE49-F238E27FC236}">
+                <a16:creationId xmlns:a16="http://schemas.microsoft.com/office/drawing/2014/main" id="{1F781B50-3BCC-001B-8E63-999A04AA874F}"/>
+              </a:ext>
+            </a:extLst>
+          </p:cNvPr>
+          <p:cNvSpPr txBox="1"/>
+          <p:nvPr/>
+        </p:nvSpPr>
+        <p:spPr>
+          <a:xfrm>
+            <a:off x="685775" y="4598917"/>
+            <a:ext cx="10999203" cy="830997"/>
+          </a:xfrm>
+          <a:prstGeom prst="rect">
+            <a:avLst/>
+          </a:prstGeom>
+          <a:noFill/>
+        </p:spPr>
+        <p:txBody>
+          <a:bodyPr wrap="square" rtlCol="0">
+            <a:spAutoFit/>
+          </a:bodyPr>
+          <a:lstStyle/>
+          <a:p>
+            <a:pPr lvl="1"/>
+            <a:r>
+              <a:rPr lang="bg-BG" sz="2400" dirty="0">
+                <a:solidFill>
+                  <a:srgbClr val="0070C0"/>
+                </a:solidFill>
+                <a:latin typeface="Consolas" panose="020B0609020204030204" pitchFamily="49" charset="0"/>
+              </a:rPr>
+              <a:t>За </a:t>
+            </a:r>
+            <a:r>
+              <a:rPr lang="bg-BG" sz="2400" b="1" dirty="0">
+                <a:solidFill>
+                  <a:schemeClr val="accent2"/>
+                </a:solidFill>
+                <a:latin typeface="Consolas" panose="020B0609020204030204" pitchFamily="49" charset="0"/>
+              </a:rPr>
+              <a:t>двоични дървета</a:t>
+            </a:r>
+          </a:p>
+          <a:p>
+            <a:pPr lvl="1"/>
+            <a:r>
+              <a:rPr lang="bg-BG" sz="2400" dirty="0">
+                <a:solidFill>
+                  <a:schemeClr val="accent2"/>
+                </a:solidFill>
+                <a:latin typeface="Consolas" panose="020B0609020204030204" pitchFamily="49" charset="0"/>
+              </a:rPr>
+              <a:t>- Ляво дете – дясно дете</a:t>
+            </a:r>
+            <a:endParaRPr lang="en-GB" sz="2400" dirty="0">
+              <a:solidFill>
+                <a:schemeClr val="accent2"/>
+              </a:solidFill>
+              <a:latin typeface="Consolas" panose="020B0609020204030204" pitchFamily="49" charset="0"/>
+            </a:endParaRPr>
+          </a:p>
+        </p:txBody>
+      </p:sp>
+      <p:pic>
+        <p:nvPicPr>
+          <p:cNvPr id="20" name="Картина 19">
+            <a:extLst>
+              <a:ext uri="{FF2B5EF4-FFF2-40B4-BE49-F238E27FC236}">
+                <a16:creationId xmlns:a16="http://schemas.microsoft.com/office/drawing/2014/main" id="{E1AEAEDA-91E3-E4E0-FF53-F0577DF19C73}"/>
+              </a:ext>
+            </a:extLst>
+          </p:cNvPr>
+          <p:cNvPicPr>
+            <a:picLocks noChangeAspect="1"/>
+          </p:cNvPicPr>
+          <p:nvPr/>
+        </p:nvPicPr>
+        <p:blipFill>
+          <a:blip r:embed="rId6"/>
+          <a:stretch>
+            <a:fillRect/>
+          </a:stretch>
+        </p:blipFill>
+        <p:spPr>
+          <a:xfrm>
+            <a:off x="1827334" y="5469503"/>
+            <a:ext cx="6076950" cy="1047750"/>
+          </a:xfrm>
+          <a:prstGeom prst="rect">
+            <a:avLst/>
+          </a:prstGeom>
+        </p:spPr>
+      </p:pic>
+    </p:spTree>
+    <p:extLst>
+      <p:ext uri="{BB962C8B-B14F-4D97-AF65-F5344CB8AC3E}">
+        <p14:creationId xmlns:p14="http://schemas.microsoft.com/office/powerpoint/2010/main" val="3021493663"/>
+      </p:ext>
+    </p:extLst>
+  </p:cSld>
+  <p:clrMapOvr>
+    <a:masterClrMapping/>
+  </p:clrMapOvr>
+</p:sld>
+</file>
+
+<file path=ppt/slides/slide17.xml><?xml version="1.0" encoding="utf-8"?>
+<p:sld xmlns:a="http://schemas.openxmlformats.org/drawingml/2006/main" xmlns:r="http://schemas.openxmlformats.org/officeDocument/2006/relationships" xmlns:p="http://schemas.openxmlformats.org/presentationml/2006/main">
+  <p:cSld>
+    <p:spTree>
+      <p:nvGrpSpPr>
+        <p:cNvPr id="1" name=""/>
+        <p:cNvGrpSpPr/>
+        <p:nvPr/>
+      </p:nvGrpSpPr>
+      <p:grpSpPr>
+        <a:xfrm>
+          <a:off x="0" y="0"/>
+          <a:ext cx="0" cy="0"/>
+          <a:chOff x="0" y="0"/>
+          <a:chExt cx="0" cy="0"/>
+        </a:xfrm>
+      </p:grpSpPr>
+      <p:sp>
+        <p:nvSpPr>
+          <p:cNvPr id="3" name="Правоъгълник 2">
+            <a:extLst>
+              <a:ext uri="{FF2B5EF4-FFF2-40B4-BE49-F238E27FC236}">
+                <a16:creationId xmlns:a16="http://schemas.microsoft.com/office/drawing/2014/main" id="{C4C4CCE4-6FAF-6FB7-D4A3-B99110DD8FF4}"/>
+              </a:ext>
+            </a:extLst>
+          </p:cNvPr>
+          <p:cNvSpPr/>
+          <p:nvPr/>
+        </p:nvSpPr>
+        <p:spPr>
+          <a:xfrm>
+            <a:off x="8791" y="2"/>
+            <a:ext cx="940778" cy="6857998"/>
+          </a:xfrm>
+          <a:prstGeom prst="rect">
+            <a:avLst/>
+          </a:prstGeom>
+        </p:spPr>
+        <p:style>
+          <a:lnRef idx="2">
+            <a:schemeClr val="accent1">
+              <a:shade val="15000"/>
+            </a:schemeClr>
+          </a:lnRef>
+          <a:fillRef idx="1">
+            <a:schemeClr val="accent1"/>
+          </a:fillRef>
+          <a:effectRef idx="0">
+            <a:schemeClr val="accent1"/>
+          </a:effectRef>
+          <a:fontRef idx="minor">
+            <a:schemeClr val="lt1"/>
+          </a:fontRef>
+        </p:style>
+        <p:txBody>
+          <a:bodyPr rtlCol="0" anchor="ctr"/>
+          <a:lstStyle/>
+          <a:p>
+            <a:pPr algn="ctr"/>
+            <a:endParaRPr lang="en-GB" dirty="0"/>
+          </a:p>
+        </p:txBody>
+      </p:sp>
+      <p:sp>
+        <p:nvSpPr>
+          <p:cNvPr id="4" name="Текстово поле 3">
+            <a:extLst>
+              <a:ext uri="{FF2B5EF4-FFF2-40B4-BE49-F238E27FC236}">
+                <a16:creationId xmlns:a16="http://schemas.microsoft.com/office/drawing/2014/main" id="{D8C042C9-D12F-A349-AB33-E6A49C5CAAD8}"/>
+              </a:ext>
+            </a:extLst>
+          </p:cNvPr>
+          <p:cNvSpPr txBox="1"/>
+          <p:nvPr/>
+        </p:nvSpPr>
+        <p:spPr>
+          <a:xfrm>
+            <a:off x="1107825" y="156016"/>
+            <a:ext cx="6287299" cy="584775"/>
+          </a:xfrm>
+          <a:prstGeom prst="rect">
+            <a:avLst/>
+          </a:prstGeom>
+          <a:noFill/>
+        </p:spPr>
+        <p:txBody>
+          <a:bodyPr wrap="none" rtlCol="0">
+            <a:spAutoFit/>
+          </a:bodyPr>
+          <a:lstStyle/>
+          <a:p>
+            <a:r>
+              <a:rPr lang="en-GB" sz="3200" b="1" dirty="0">
+                <a:solidFill>
+                  <a:srgbClr val="0070C0"/>
+                </a:solidFill>
+                <a:latin typeface="Consolas" panose="020B0609020204030204" pitchFamily="49" charset="0"/>
+              </a:rPr>
+              <a:t>2.3 </a:t>
+            </a:r>
+            <a:r>
+              <a:rPr lang="bg-BG" sz="3200" b="1" dirty="0">
+                <a:solidFill>
+                  <a:srgbClr val="0070C0"/>
+                </a:solidFill>
+                <a:latin typeface="Consolas" panose="020B0609020204030204" pitchFamily="49" charset="0"/>
+              </a:rPr>
+              <a:t>Покриващо дърво на граф</a:t>
+            </a:r>
+            <a:endParaRPr lang="en-GB" sz="3200" b="1" dirty="0">
+              <a:solidFill>
+                <a:srgbClr val="0070C0"/>
+              </a:solidFill>
+              <a:latin typeface="Consolas" panose="020B0609020204030204" pitchFamily="49" charset="0"/>
+            </a:endParaRPr>
+          </a:p>
+        </p:txBody>
+      </p:sp>
+      <p:sp>
+        <p:nvSpPr>
+          <p:cNvPr id="16" name="Текстово поле 15">
+            <a:extLst>
+              <a:ext uri="{FF2B5EF4-FFF2-40B4-BE49-F238E27FC236}">
+                <a16:creationId xmlns:a16="http://schemas.microsoft.com/office/drawing/2014/main" id="{3E348C78-D6D9-A728-1765-3F7A272B9A4E}"/>
+              </a:ext>
+            </a:extLst>
+          </p:cNvPr>
+          <p:cNvSpPr txBox="1"/>
+          <p:nvPr/>
+        </p:nvSpPr>
+        <p:spPr>
+          <a:xfrm rot="16200000">
+            <a:off x="-816207" y="1248959"/>
+            <a:ext cx="2590774" cy="369332"/>
+          </a:xfrm>
+          <a:prstGeom prst="rect">
+            <a:avLst/>
+          </a:prstGeom>
+          <a:noFill/>
+        </p:spPr>
+        <p:txBody>
+          <a:bodyPr wrap="none" rtlCol="0">
+            <a:spAutoFit/>
+          </a:bodyPr>
+          <a:lstStyle/>
+          <a:p>
+            <a:r>
+              <a:rPr lang="bg-BG" dirty="0">
+                <a:solidFill>
+                  <a:schemeClr val="bg1"/>
+                </a:solidFill>
+                <a:latin typeface="Consolas" panose="020B0609020204030204" pitchFamily="49" charset="0"/>
+              </a:rPr>
+              <a:t>2.3 </a:t>
+            </a:r>
+            <a:r>
+              <a:rPr lang="bg-BG" dirty="0" err="1">
+                <a:solidFill>
+                  <a:schemeClr val="bg1"/>
+                </a:solidFill>
+                <a:latin typeface="Consolas" panose="020B0609020204030204" pitchFamily="49" charset="0"/>
+              </a:rPr>
+              <a:t>Покривъщо</a:t>
+            </a:r>
+            <a:r>
+              <a:rPr lang="bg-BG" dirty="0">
+                <a:solidFill>
+                  <a:schemeClr val="bg1"/>
+                </a:solidFill>
+                <a:latin typeface="Consolas" panose="020B0609020204030204" pitchFamily="49" charset="0"/>
+              </a:rPr>
+              <a:t> дърво</a:t>
+            </a:r>
+            <a:endParaRPr lang="en-GB" dirty="0">
+              <a:solidFill>
+                <a:schemeClr val="bg1"/>
+              </a:solidFill>
+              <a:latin typeface="Consolas" panose="020B0609020204030204" pitchFamily="49" charset="0"/>
+            </a:endParaRPr>
+          </a:p>
+        </p:txBody>
+      </p:sp>
+      <p:cxnSp>
+        <p:nvCxnSpPr>
+          <p:cNvPr id="6" name="Право съединение 5">
+            <a:extLst>
+              <a:ext uri="{FF2B5EF4-FFF2-40B4-BE49-F238E27FC236}">
+                <a16:creationId xmlns:a16="http://schemas.microsoft.com/office/drawing/2014/main" id="{3434733A-9C28-1217-62E3-CB9178A07F2B}"/>
+              </a:ext>
+            </a:extLst>
+          </p:cNvPr>
+          <p:cNvCxnSpPr/>
+          <p:nvPr/>
+        </p:nvCxnSpPr>
+        <p:spPr>
+          <a:xfrm>
+            <a:off x="949569" y="738552"/>
+            <a:ext cx="11242431" cy="0"/>
+          </a:xfrm>
+          <a:prstGeom prst="line">
+            <a:avLst/>
+          </a:prstGeom>
+        </p:spPr>
+        <p:style>
+          <a:lnRef idx="1">
+            <a:schemeClr val="accent1"/>
+          </a:lnRef>
+          <a:fillRef idx="0">
+            <a:schemeClr val="accent1"/>
+          </a:fillRef>
+          <a:effectRef idx="0">
+            <a:schemeClr val="accent1"/>
+          </a:effectRef>
+          <a:fontRef idx="minor">
+            <a:schemeClr val="tx1"/>
+          </a:fontRef>
+        </p:style>
+      </p:cxnSp>
+      <p:pic>
+        <p:nvPicPr>
+          <p:cNvPr id="12" name="Картина 11">
+            <a:extLst>
+              <a:ext uri="{FF2B5EF4-FFF2-40B4-BE49-F238E27FC236}">
+                <a16:creationId xmlns:a16="http://schemas.microsoft.com/office/drawing/2014/main" id="{881DA5FD-9154-AE67-9675-32AD0DEB7204}"/>
+              </a:ext>
+            </a:extLst>
+          </p:cNvPr>
+          <p:cNvPicPr>
+            <a:picLocks noChangeAspect="1"/>
+          </p:cNvPicPr>
+          <p:nvPr/>
+        </p:nvPicPr>
+        <p:blipFill>
+          <a:blip r:embed="rId2"/>
+          <a:stretch>
+            <a:fillRect/>
+          </a:stretch>
+        </p:blipFill>
+        <p:spPr>
+          <a:xfrm>
+            <a:off x="1963249" y="2729012"/>
+            <a:ext cx="2867025" cy="3067050"/>
+          </a:xfrm>
+          <a:prstGeom prst="rect">
+            <a:avLst/>
+          </a:prstGeom>
+        </p:spPr>
+      </p:pic>
+      <p:pic>
+        <p:nvPicPr>
+          <p:cNvPr id="15" name="Картина 14">
+            <a:extLst>
+              <a:ext uri="{FF2B5EF4-FFF2-40B4-BE49-F238E27FC236}">
+                <a16:creationId xmlns:a16="http://schemas.microsoft.com/office/drawing/2014/main" id="{8C1FD1B2-9190-C496-28B8-AFF9D0217122}"/>
+              </a:ext>
+            </a:extLst>
+          </p:cNvPr>
+          <p:cNvPicPr>
+            <a:picLocks noChangeAspect="1"/>
+          </p:cNvPicPr>
+          <p:nvPr/>
+        </p:nvPicPr>
+        <p:blipFill>
+          <a:blip r:embed="rId3"/>
+          <a:stretch>
+            <a:fillRect/>
+          </a:stretch>
+        </p:blipFill>
+        <p:spPr>
+          <a:xfrm>
+            <a:off x="6183856" y="1430926"/>
+            <a:ext cx="2202365" cy="5156758"/>
+          </a:xfrm>
+          <a:prstGeom prst="rect">
+            <a:avLst/>
+          </a:prstGeom>
+        </p:spPr>
+      </p:pic>
+      <p:sp>
+        <p:nvSpPr>
+          <p:cNvPr id="17" name="Текстово поле 16">
+            <a:extLst>
+              <a:ext uri="{FF2B5EF4-FFF2-40B4-BE49-F238E27FC236}">
+                <a16:creationId xmlns:a16="http://schemas.microsoft.com/office/drawing/2014/main" id="{1E906353-0989-5E48-E2A4-F53E4B425D79}"/>
+              </a:ext>
+            </a:extLst>
+          </p:cNvPr>
+          <p:cNvSpPr txBox="1"/>
+          <p:nvPr/>
+        </p:nvSpPr>
+        <p:spPr>
+          <a:xfrm>
+            <a:off x="668189" y="830611"/>
+            <a:ext cx="10999203" cy="830997"/>
+          </a:xfrm>
+          <a:prstGeom prst="rect">
+            <a:avLst/>
+          </a:prstGeom>
+          <a:noFill/>
+        </p:spPr>
+        <p:txBody>
+          <a:bodyPr wrap="square" rtlCol="0">
+            <a:spAutoFit/>
+          </a:bodyPr>
+          <a:lstStyle/>
+          <a:p>
+            <a:pPr lvl="1"/>
+            <a:r>
+              <a:rPr lang="bg-BG" sz="2400" dirty="0">
+                <a:solidFill>
+                  <a:schemeClr val="accent2"/>
+                </a:solidFill>
+                <a:latin typeface="Consolas" panose="020B0609020204030204" pitchFamily="49" charset="0"/>
+              </a:rPr>
+              <a:t>Теорема. </a:t>
+            </a:r>
+            <a:r>
+              <a:rPr lang="bg-BG" sz="2400" dirty="0">
+                <a:solidFill>
+                  <a:schemeClr val="accent1"/>
+                </a:solidFill>
+                <a:latin typeface="Consolas" panose="020B0609020204030204" pitchFamily="49" charset="0"/>
+              </a:rPr>
+              <a:t>Граф е свързан тогава и само тогава, когато има </a:t>
+            </a:r>
+            <a:r>
+              <a:rPr lang="bg-BG" sz="2400" dirty="0">
+                <a:solidFill>
+                  <a:schemeClr val="accent2"/>
+                </a:solidFill>
+                <a:latin typeface="Consolas" panose="020B0609020204030204" pitchFamily="49" charset="0"/>
+              </a:rPr>
+              <a:t>покриващо дърво</a:t>
+            </a:r>
+            <a:endParaRPr lang="en-GB" sz="2400" dirty="0">
+              <a:solidFill>
+                <a:schemeClr val="accent2"/>
+              </a:solidFill>
+              <a:latin typeface="Consolas" panose="020B0609020204030204" pitchFamily="49" charset="0"/>
+            </a:endParaRPr>
+          </a:p>
+        </p:txBody>
+      </p:sp>
+    </p:spTree>
+    <p:extLst>
+      <p:ext uri="{BB962C8B-B14F-4D97-AF65-F5344CB8AC3E}">
+        <p14:creationId xmlns:p14="http://schemas.microsoft.com/office/powerpoint/2010/main" val="2378582565"/>
+      </p:ext>
+    </p:extLst>
+  </p:cSld>
+  <p:clrMapOvr>
+    <a:masterClrMapping/>
+  </p:clrMapOvr>
+</p:sld>
+</file>
+
+<file path=ppt/slides/slide18.xml><?xml version="1.0" encoding="utf-8"?>
+<p:sld xmlns:a="http://schemas.openxmlformats.org/drawingml/2006/main" xmlns:r="http://schemas.openxmlformats.org/officeDocument/2006/relationships" xmlns:p="http://schemas.openxmlformats.org/presentationml/2006/main">
+  <p:cSld>
+    <p:spTree>
+      <p:nvGrpSpPr>
+        <p:cNvPr id="1" name=""/>
+        <p:cNvGrpSpPr/>
+        <p:nvPr/>
+      </p:nvGrpSpPr>
+      <p:grpSpPr>
+        <a:xfrm>
+          <a:off x="0" y="0"/>
+          <a:ext cx="0" cy="0"/>
+          <a:chOff x="0" y="0"/>
+          <a:chExt cx="0" cy="0"/>
+        </a:xfrm>
+      </p:grpSpPr>
+      <p:sp>
+        <p:nvSpPr>
+          <p:cNvPr id="3" name="Правоъгълник 2">
+            <a:extLst>
+              <a:ext uri="{FF2B5EF4-FFF2-40B4-BE49-F238E27FC236}">
+                <a16:creationId xmlns:a16="http://schemas.microsoft.com/office/drawing/2014/main" id="{C4C4CCE4-6FAF-6FB7-D4A3-B99110DD8FF4}"/>
+              </a:ext>
+            </a:extLst>
+          </p:cNvPr>
+          <p:cNvSpPr/>
+          <p:nvPr/>
+        </p:nvSpPr>
+        <p:spPr>
+          <a:xfrm>
+            <a:off x="8791" y="2"/>
+            <a:ext cx="940778" cy="6857998"/>
+          </a:xfrm>
+          <a:prstGeom prst="rect">
+            <a:avLst/>
+          </a:prstGeom>
+        </p:spPr>
+        <p:style>
+          <a:lnRef idx="2">
+            <a:schemeClr val="accent1">
+              <a:shade val="15000"/>
+            </a:schemeClr>
+          </a:lnRef>
+          <a:fillRef idx="1">
+            <a:schemeClr val="accent1"/>
+          </a:fillRef>
+          <a:effectRef idx="0">
+            <a:schemeClr val="accent1"/>
+          </a:effectRef>
+          <a:fontRef idx="minor">
+            <a:schemeClr val="lt1"/>
+          </a:fontRef>
+        </p:style>
+        <p:txBody>
+          <a:bodyPr rtlCol="0" anchor="ctr"/>
+          <a:lstStyle/>
+          <a:p>
+            <a:pPr algn="ctr"/>
+            <a:endParaRPr lang="en-GB" dirty="0"/>
+          </a:p>
+        </p:txBody>
+      </p:sp>
+      <p:sp>
+        <p:nvSpPr>
+          <p:cNvPr id="4" name="Текстово поле 3">
+            <a:extLst>
+              <a:ext uri="{FF2B5EF4-FFF2-40B4-BE49-F238E27FC236}">
+                <a16:creationId xmlns:a16="http://schemas.microsoft.com/office/drawing/2014/main" id="{D8C042C9-D12F-A349-AB33-E6A49C5CAAD8}"/>
+              </a:ext>
+            </a:extLst>
+          </p:cNvPr>
+          <p:cNvSpPr txBox="1"/>
+          <p:nvPr/>
+        </p:nvSpPr>
+        <p:spPr>
+          <a:xfrm>
+            <a:off x="1107825" y="156016"/>
+            <a:ext cx="3348994" cy="584775"/>
+          </a:xfrm>
+          <a:prstGeom prst="rect">
+            <a:avLst/>
+          </a:prstGeom>
+          <a:noFill/>
+        </p:spPr>
+        <p:txBody>
+          <a:bodyPr wrap="none" rtlCol="0">
+            <a:spAutoFit/>
+          </a:bodyPr>
+          <a:lstStyle/>
+          <a:p>
+            <a:r>
+              <a:rPr lang="bg-BG" sz="3200" b="1" dirty="0">
+                <a:solidFill>
+                  <a:srgbClr val="0070C0"/>
+                </a:solidFill>
+                <a:latin typeface="Consolas" panose="020B0609020204030204" pitchFamily="49" charset="0"/>
+              </a:rPr>
+              <a:t>2.4 Упражнения</a:t>
+            </a:r>
+            <a:endParaRPr lang="en-GB" sz="3200" b="1" dirty="0">
+              <a:solidFill>
+                <a:srgbClr val="0070C0"/>
+              </a:solidFill>
+              <a:latin typeface="Consolas" panose="020B0609020204030204" pitchFamily="49" charset="0"/>
+            </a:endParaRPr>
+          </a:p>
+        </p:txBody>
+      </p:sp>
+      <p:sp>
+        <p:nvSpPr>
+          <p:cNvPr id="16" name="Текстово поле 15">
+            <a:extLst>
+              <a:ext uri="{FF2B5EF4-FFF2-40B4-BE49-F238E27FC236}">
+                <a16:creationId xmlns:a16="http://schemas.microsoft.com/office/drawing/2014/main" id="{3E348C78-D6D9-A728-1765-3F7A272B9A4E}"/>
+              </a:ext>
+            </a:extLst>
+          </p:cNvPr>
+          <p:cNvSpPr txBox="1"/>
+          <p:nvPr/>
+        </p:nvSpPr>
+        <p:spPr>
+          <a:xfrm rot="16200000">
+            <a:off x="-581303" y="950144"/>
+            <a:ext cx="2084225" cy="369332"/>
+          </a:xfrm>
+          <a:prstGeom prst="rect">
+            <a:avLst/>
+          </a:prstGeom>
+          <a:noFill/>
+        </p:spPr>
+        <p:txBody>
+          <a:bodyPr wrap="none" rtlCol="0">
+            <a:spAutoFit/>
+          </a:bodyPr>
+          <a:lstStyle/>
+          <a:p>
+            <a:r>
+              <a:rPr lang="en-GB" dirty="0">
+                <a:solidFill>
+                  <a:schemeClr val="bg1"/>
+                </a:solidFill>
+                <a:latin typeface="Consolas" panose="020B0609020204030204" pitchFamily="49" charset="0"/>
+              </a:rPr>
+              <a:t>2.4. </a:t>
+            </a:r>
+            <a:r>
+              <a:rPr lang="bg-BG" dirty="0">
+                <a:solidFill>
+                  <a:schemeClr val="bg1"/>
+                </a:solidFill>
+                <a:latin typeface="Consolas" panose="020B0609020204030204" pitchFamily="49" charset="0"/>
+              </a:rPr>
+              <a:t>Упражнения</a:t>
+            </a:r>
+            <a:endParaRPr lang="en-GB" dirty="0">
+              <a:solidFill>
+                <a:schemeClr val="bg1"/>
+              </a:solidFill>
+              <a:latin typeface="Consolas" panose="020B0609020204030204" pitchFamily="49" charset="0"/>
+            </a:endParaRPr>
+          </a:p>
+        </p:txBody>
+      </p:sp>
+      <p:cxnSp>
+        <p:nvCxnSpPr>
+          <p:cNvPr id="6" name="Право съединение 5">
+            <a:extLst>
+              <a:ext uri="{FF2B5EF4-FFF2-40B4-BE49-F238E27FC236}">
+                <a16:creationId xmlns:a16="http://schemas.microsoft.com/office/drawing/2014/main" id="{3434733A-9C28-1217-62E3-CB9178A07F2B}"/>
+              </a:ext>
+            </a:extLst>
+          </p:cNvPr>
+          <p:cNvCxnSpPr/>
+          <p:nvPr/>
+        </p:nvCxnSpPr>
+        <p:spPr>
+          <a:xfrm>
+            <a:off x="949569" y="738552"/>
+            <a:ext cx="11242431" cy="0"/>
+          </a:xfrm>
+          <a:prstGeom prst="line">
+            <a:avLst/>
+          </a:prstGeom>
+        </p:spPr>
+        <p:style>
+          <a:lnRef idx="1">
+            <a:schemeClr val="accent1"/>
+          </a:lnRef>
+          <a:fillRef idx="0">
+            <a:schemeClr val="accent1"/>
+          </a:fillRef>
+          <a:effectRef idx="0">
+            <a:schemeClr val="accent1"/>
+          </a:effectRef>
+          <a:fontRef idx="minor">
+            <a:schemeClr val="tx1"/>
+          </a:fontRef>
+        </p:style>
+      </p:cxnSp>
+      <p:pic>
+        <p:nvPicPr>
+          <p:cNvPr id="5" name="Картина 4">
+            <a:extLst>
+              <a:ext uri="{FF2B5EF4-FFF2-40B4-BE49-F238E27FC236}">
+                <a16:creationId xmlns:a16="http://schemas.microsoft.com/office/drawing/2014/main" id="{1C6D7C76-5692-1EF3-BF16-52915230C51D}"/>
+              </a:ext>
+            </a:extLst>
+          </p:cNvPr>
+          <p:cNvPicPr>
+            <a:picLocks noChangeAspect="1"/>
+          </p:cNvPicPr>
+          <p:nvPr/>
+        </p:nvPicPr>
+        <p:blipFill>
+          <a:blip r:embed="rId2"/>
+          <a:stretch>
+            <a:fillRect/>
+          </a:stretch>
+        </p:blipFill>
+        <p:spPr>
+          <a:xfrm>
+            <a:off x="1216921" y="1025769"/>
+            <a:ext cx="10635110" cy="1820424"/>
+          </a:xfrm>
+          <a:prstGeom prst="rect">
+            <a:avLst/>
+          </a:prstGeom>
+        </p:spPr>
+      </p:pic>
+      <p:pic>
+        <p:nvPicPr>
+          <p:cNvPr id="10" name="Картина 9">
+            <a:extLst>
+              <a:ext uri="{FF2B5EF4-FFF2-40B4-BE49-F238E27FC236}">
+                <a16:creationId xmlns:a16="http://schemas.microsoft.com/office/drawing/2014/main" id="{5F8A100C-6CD1-E38B-F7C0-B4B9987E23F7}"/>
+              </a:ext>
+            </a:extLst>
+          </p:cNvPr>
+          <p:cNvPicPr>
+            <a:picLocks noChangeAspect="1"/>
+          </p:cNvPicPr>
+          <p:nvPr/>
+        </p:nvPicPr>
+        <p:blipFill>
+          <a:blip r:embed="rId3"/>
+          <a:stretch>
+            <a:fillRect/>
+          </a:stretch>
+        </p:blipFill>
+        <p:spPr>
+          <a:xfrm>
+            <a:off x="1216922" y="3056453"/>
+            <a:ext cx="10635110" cy="1648201"/>
+          </a:xfrm>
+          <a:prstGeom prst="rect">
+            <a:avLst/>
+          </a:prstGeom>
+        </p:spPr>
+      </p:pic>
+      <p:pic>
+        <p:nvPicPr>
+          <p:cNvPr id="12" name="Картина 11">
+            <a:extLst>
+              <a:ext uri="{FF2B5EF4-FFF2-40B4-BE49-F238E27FC236}">
+                <a16:creationId xmlns:a16="http://schemas.microsoft.com/office/drawing/2014/main" id="{81771716-2F58-F9C8-3162-486E9661FD4F}"/>
+              </a:ext>
+            </a:extLst>
+          </p:cNvPr>
+          <p:cNvPicPr>
+            <a:picLocks noChangeAspect="1"/>
+          </p:cNvPicPr>
+          <p:nvPr/>
+        </p:nvPicPr>
+        <p:blipFill>
+          <a:blip r:embed="rId4"/>
+          <a:stretch>
+            <a:fillRect/>
+          </a:stretch>
+        </p:blipFill>
+        <p:spPr>
+          <a:xfrm>
+            <a:off x="1216921" y="4914913"/>
+            <a:ext cx="10635110" cy="1495375"/>
+          </a:xfrm>
+          <a:prstGeom prst="rect">
+            <a:avLst/>
+          </a:prstGeom>
+        </p:spPr>
+      </p:pic>
+    </p:spTree>
+    <p:extLst>
+      <p:ext uri="{BB962C8B-B14F-4D97-AF65-F5344CB8AC3E}">
+        <p14:creationId xmlns:p14="http://schemas.microsoft.com/office/powerpoint/2010/main" val="945796217"/>
+      </p:ext>
+    </p:extLst>
+  </p:cSld>
+  <p:clrMapOvr>
+    <a:masterClrMapping/>
+  </p:clrMapOvr>
+</p:sld>
+</file>
+
 <file path=ppt/slides/slide2.xml><?xml version="1.0" encoding="utf-8"?>
 <p:sld xmlns:a="http://schemas.openxmlformats.org/drawingml/2006/main" xmlns:r="http://schemas.openxmlformats.org/officeDocument/2006/relationships" xmlns:p="http://schemas.openxmlformats.org/presentationml/2006/main">
   <p:cSld>
@@ -5186,7 +6933,7 @@
         <p:spPr>
           <a:xfrm>
             <a:off x="334107" y="1384711"/>
-            <a:ext cx="6664569" cy="3539430"/>
+            <a:ext cx="6664569" cy="4893647"/>
           </a:xfrm>
           <a:prstGeom prst="rect">
             <a:avLst/>
@@ -5204,7 +6951,7 @@
               <a:buAutoNum type="arabicPeriod"/>
             </a:pPr>
             <a:r>
-              <a:rPr lang="bg-BG" sz="2800" dirty="0">
+              <a:rPr lang="bg-BG" sz="2400" dirty="0">
                 <a:solidFill>
                   <a:srgbClr val="0070C0"/>
                 </a:solidFill>
@@ -5219,7 +6966,7 @@
               <a:buAutoNum type="arabicPeriod"/>
             </a:pPr>
             <a:r>
-              <a:rPr lang="bg-BG" sz="2800" dirty="0">
+              <a:rPr lang="bg-BG" sz="2400" dirty="0">
                 <a:solidFill>
                   <a:srgbClr val="0070C0"/>
                 </a:solidFill>
@@ -5234,7 +6981,7 @@
               <a:buAutoNum type="arabicPeriod"/>
             </a:pPr>
             <a:r>
-              <a:rPr lang="bg-BG" sz="2800" dirty="0">
+              <a:rPr lang="bg-BG" sz="2400" dirty="0">
                 <a:solidFill>
                   <a:srgbClr val="0070C0"/>
                 </a:solidFill>
@@ -5249,7 +6996,7 @@
               <a:buAutoNum type="arabicPeriod"/>
             </a:pPr>
             <a:r>
-              <a:rPr lang="bg-BG" sz="2800" dirty="0">
+              <a:rPr lang="bg-BG" sz="2400" dirty="0">
                 <a:solidFill>
                   <a:srgbClr val="0070C0"/>
                 </a:solidFill>
@@ -5264,7 +7011,7 @@
               <a:buAutoNum type="arabicPeriod"/>
             </a:pPr>
             <a:r>
-              <a:rPr lang="bg-BG" sz="2800" dirty="0">
+              <a:rPr lang="bg-BG" sz="2400" dirty="0">
                 <a:solidFill>
                   <a:srgbClr val="0070C0"/>
                 </a:solidFill>
@@ -5279,7 +7026,7 @@
               <a:buAutoNum type="arabicPeriod"/>
             </a:pPr>
             <a:r>
-              <a:rPr lang="bg-BG" sz="2800" dirty="0">
+              <a:rPr lang="bg-BG" sz="2400" dirty="0">
                 <a:solidFill>
                   <a:srgbClr val="0070C0"/>
                 </a:solidFill>
@@ -5294,7 +7041,7 @@
               <a:buAutoNum type="arabicPeriod"/>
             </a:pPr>
             <a:r>
-              <a:rPr lang="bg-BG" sz="2800" dirty="0">
+              <a:rPr lang="bg-BG" sz="2400" dirty="0">
                 <a:solidFill>
                   <a:srgbClr val="0070C0"/>
                 </a:solidFill>
@@ -5309,7 +7056,7 @@
               <a:buAutoNum type="arabicPeriod"/>
             </a:pPr>
             <a:r>
-              <a:rPr lang="bg-BG" sz="2800" dirty="0">
+              <a:rPr lang="bg-BG" sz="2400" dirty="0">
                 <a:solidFill>
                   <a:srgbClr val="0070C0"/>
                 </a:solidFill>
@@ -5317,6 +7064,87 @@
               </a:rPr>
               <a:t>Упражнения</a:t>
             </a:r>
+          </a:p>
+          <a:p>
+            <a:pPr marL="514350" indent="-514350">
+              <a:buFont typeface="+mj-lt"/>
+              <a:buAutoNum type="arabicPeriod"/>
+            </a:pPr>
+            <a:r>
+              <a:rPr lang="bg-BG" sz="2400" dirty="0">
+                <a:solidFill>
+                  <a:srgbClr val="0070C0"/>
+                </a:solidFill>
+                <a:latin typeface="Consolas" panose="020B0609020204030204" pitchFamily="49" charset="0"/>
+              </a:rPr>
+              <a:t>Дървета</a:t>
+            </a:r>
+          </a:p>
+          <a:p>
+            <a:pPr marL="971550" lvl="1" indent="-514350">
+              <a:buFont typeface="+mj-lt"/>
+              <a:buAutoNum type="arabicPeriod"/>
+            </a:pPr>
+            <a:r>
+              <a:rPr lang="bg-BG" sz="2400" dirty="0">
+                <a:solidFill>
+                  <a:srgbClr val="0070C0"/>
+                </a:solidFill>
+                <a:latin typeface="Consolas" panose="020B0609020204030204" pitchFamily="49" charset="0"/>
+              </a:rPr>
+              <a:t>Дърво и кореново дърво</a:t>
+            </a:r>
+          </a:p>
+          <a:p>
+            <a:pPr marL="971550" lvl="1" indent="-514350">
+              <a:buFont typeface="+mj-lt"/>
+              <a:buAutoNum type="arabicPeriod"/>
+            </a:pPr>
+            <a:r>
+              <a:rPr lang="bg-BG" sz="2400" dirty="0">
+                <a:solidFill>
+                  <a:srgbClr val="0070C0"/>
+                </a:solidFill>
+                <a:latin typeface="Consolas" panose="020B0609020204030204" pitchFamily="49" charset="0"/>
+              </a:rPr>
+              <a:t>Представяне на дърво</a:t>
+            </a:r>
+          </a:p>
+          <a:p>
+            <a:pPr marL="971550" lvl="1" indent="-514350">
+              <a:buFont typeface="+mj-lt"/>
+              <a:buAutoNum type="arabicPeriod"/>
+            </a:pPr>
+            <a:r>
+              <a:rPr lang="bg-BG" sz="2400" dirty="0">
+                <a:solidFill>
+                  <a:srgbClr val="0070C0"/>
+                </a:solidFill>
+                <a:latin typeface="Consolas" panose="020B0609020204030204" pitchFamily="49" charset="0"/>
+              </a:rPr>
+              <a:t>Покриващо дърво на граф</a:t>
+            </a:r>
+          </a:p>
+          <a:p>
+            <a:pPr marL="971550" lvl="1" indent="-514350">
+              <a:buFont typeface="+mj-lt"/>
+              <a:buAutoNum type="arabicPeriod"/>
+            </a:pPr>
+            <a:r>
+              <a:rPr lang="bg-BG" sz="2400">
+                <a:solidFill>
+                  <a:srgbClr val="0070C0"/>
+                </a:solidFill>
+                <a:latin typeface="Consolas" panose="020B0609020204030204" pitchFamily="49" charset="0"/>
+              </a:rPr>
+              <a:t>Упражнения</a:t>
+            </a:r>
+            <a:endParaRPr lang="bg-BG" sz="2400" dirty="0">
+              <a:solidFill>
+                <a:srgbClr val="0070C0"/>
+              </a:solidFill>
+              <a:latin typeface="Consolas" panose="020B0609020204030204" pitchFamily="49" charset="0"/>
+            </a:endParaRPr>
           </a:p>
         </p:txBody>
       </p:sp>

</xml_diff>